<commit_message>
Got a low res photo url
</commit_message>
<xml_diff>
--- a/Presentation/296.pptx
+++ b/Presentation/296.pptx
@@ -1,6 +1,6 @@
 
 <file path=ppt/presentation.xml><?xml version="1.0" encoding="utf-8"?>
-<p:presentation xmlns:a="http://schemas.openxmlformats.org/drawingml/2006/main" xmlns:r="http://schemas.openxmlformats.org/officeDocument/2006/relationships" xmlns:p="http://schemas.openxmlformats.org/presentationml/2006/main" autoCompressPictures="0">
+<p:presentation xmlns:a="http://schemas.openxmlformats.org/drawingml/2006/main" xmlns:r="http://schemas.openxmlformats.org/officeDocument/2006/relationships" xmlns:p="http://schemas.openxmlformats.org/presentationml/2006/main" embedTrueTypeFonts="1" autoCompressPictures="0">
   <p:sldMasterIdLst>
     <p:sldMasterId id="2147483729" r:id="rId1"/>
   </p:sldMasterIdLst>
@@ -15,6 +15,19 @@
   </p:sldIdLst>
   <p:sldSz cx="12192000" cy="6858000"/>
   <p:notesSz cx="6858000" cy="9144000"/>
+  <p:embeddedFontLst>
+    <p:embeddedFont>
+      <p:font typeface="Century Gothic" panose="020B0502020202020204" pitchFamily="34" charset="0"/>
+      <p:regular r:id="rId9"/>
+      <p:bold r:id="rId10"/>
+      <p:italic r:id="rId11"/>
+      <p:boldItalic r:id="rId12"/>
+    </p:embeddedFont>
+    <p:embeddedFont>
+      <p:font typeface="Wingdings 3" pitchFamily="2" charset="2"/>
+      <p:regular r:id="rId13"/>
+    </p:embeddedFont>
+  </p:embeddedFontLst>
   <p:defaultTextStyle>
     <a:defPPr>
       <a:defRPr lang="en-US"/>
@@ -304,7 +317,7 @@
           <a:p>
             <a:fld id="{48A87A34-81AB-432B-8DAE-1953F412C126}" type="datetimeFigureOut">
               <a:rPr lang="en-US" smtClean="0"/>
-              <a:t>3/18/2022</a:t>
+              <a:t>3/18/22</a:t>
             </a:fld>
             <a:endParaRPr lang="en-US" dirty="0"/>
           </a:p>
@@ -583,7 +596,7 @@
             <a:fld id="{48A87A34-81AB-432B-8DAE-1953F412C126}" type="datetimeFigureOut">
               <a:rPr lang="en-US" smtClean="0"/>
               <a:pPr/>
-              <a:t>3/18/2022</a:t>
+              <a:t>3/18/22</a:t>
             </a:fld>
             <a:endParaRPr lang="en-US" dirty="0"/>
           </a:p>
@@ -779,7 +792,7 @@
             <a:fld id="{48A87A34-81AB-432B-8DAE-1953F412C126}" type="datetimeFigureOut">
               <a:rPr lang="en-US" smtClean="0"/>
               <a:pPr/>
-              <a:t>3/18/2022</a:t>
+              <a:t>3/18/22</a:t>
             </a:fld>
             <a:endParaRPr lang="en-US" dirty="0"/>
           </a:p>
@@ -1054,7 +1067,7 @@
             <a:fld id="{48A87A34-81AB-432B-8DAE-1953F412C126}" type="datetimeFigureOut">
               <a:rPr lang="en-US" smtClean="0"/>
               <a:pPr/>
-              <a:t>3/18/2022</a:t>
+              <a:t>3/18/22</a:t>
             </a:fld>
             <a:endParaRPr lang="en-US" dirty="0"/>
           </a:p>
@@ -1397,7 +1410,7 @@
             <a:fld id="{48A87A34-81AB-432B-8DAE-1953F412C126}" type="datetimeFigureOut">
               <a:rPr lang="en-US" smtClean="0"/>
               <a:pPr/>
-              <a:t>3/18/2022</a:t>
+              <a:t>3/18/22</a:t>
             </a:fld>
             <a:endParaRPr lang="en-US" dirty="0"/>
           </a:p>
@@ -2022,7 +2035,7 @@
             <a:fld id="{48A87A34-81AB-432B-8DAE-1953F412C126}" type="datetimeFigureOut">
               <a:rPr lang="en-US" smtClean="0"/>
               <a:pPr/>
-              <a:t>3/18/2022</a:t>
+              <a:t>3/18/22</a:t>
             </a:fld>
             <a:endParaRPr lang="en-US" dirty="0"/>
           </a:p>
@@ -2884,7 +2897,7 @@
             <a:fld id="{48A87A34-81AB-432B-8DAE-1953F412C126}" type="datetimeFigureOut">
               <a:rPr lang="en-US" smtClean="0"/>
               <a:pPr/>
-              <a:t>3/18/2022</a:t>
+              <a:t>3/18/22</a:t>
             </a:fld>
             <a:endParaRPr lang="en-US" dirty="0"/>
           </a:p>
@@ -3055,7 +3068,7 @@
           <a:p>
             <a:fld id="{48A87A34-81AB-432B-8DAE-1953F412C126}" type="datetimeFigureOut">
               <a:rPr lang="en-US" smtClean="0"/>
-              <a:t>3/18/2022</a:t>
+              <a:t>3/18/22</a:t>
             </a:fld>
             <a:endParaRPr lang="en-US" dirty="0"/>
           </a:p>
@@ -3238,7 +3251,7 @@
           <a:p>
             <a:fld id="{48A87A34-81AB-432B-8DAE-1953F412C126}" type="datetimeFigureOut">
               <a:rPr lang="en-US" smtClean="0"/>
-              <a:t>3/18/2022</a:t>
+              <a:t>3/18/22</a:t>
             </a:fld>
             <a:endParaRPr lang="en-US" dirty="0"/>
           </a:p>
@@ -3411,7 +3424,7 @@
           <a:p>
             <a:fld id="{48A87A34-81AB-432B-8DAE-1953F412C126}" type="datetimeFigureOut">
               <a:rPr lang="en-US" smtClean="0"/>
-              <a:t>3/18/2022</a:t>
+              <a:t>3/18/22</a:t>
             </a:fld>
             <a:endParaRPr lang="en-US" dirty="0"/>
           </a:p>
@@ -3661,7 +3674,7 @@
           <a:p>
             <a:fld id="{48A87A34-81AB-432B-8DAE-1953F412C126}" type="datetimeFigureOut">
               <a:rPr lang="en-US" smtClean="0"/>
-              <a:t>3/18/2022</a:t>
+              <a:t>3/18/22</a:t>
             </a:fld>
             <a:endParaRPr lang="en-US" dirty="0"/>
           </a:p>
@@ -3956,7 +3969,7 @@
           <a:p>
             <a:fld id="{48A87A34-81AB-432B-8DAE-1953F412C126}" type="datetimeFigureOut">
               <a:rPr lang="en-US" smtClean="0"/>
-              <a:t>3/18/2022</a:t>
+              <a:t>3/18/22</a:t>
             </a:fld>
             <a:endParaRPr lang="en-US" dirty="0"/>
           </a:p>
@@ -4403,7 +4416,7 @@
           <a:p>
             <a:fld id="{48A87A34-81AB-432B-8DAE-1953F412C126}" type="datetimeFigureOut">
               <a:rPr lang="en-US" smtClean="0"/>
-              <a:t>3/18/2022</a:t>
+              <a:t>3/18/22</a:t>
             </a:fld>
             <a:endParaRPr lang="en-US" dirty="0"/>
           </a:p>
@@ -4524,7 +4537,7 @@
           <a:p>
             <a:fld id="{48A87A34-81AB-432B-8DAE-1953F412C126}" type="datetimeFigureOut">
               <a:rPr lang="en-US" smtClean="0"/>
-              <a:t>3/18/2022</a:t>
+              <a:t>3/18/22</a:t>
             </a:fld>
             <a:endParaRPr lang="en-US" dirty="0"/>
           </a:p>
@@ -4622,7 +4635,7 @@
           <a:p>
             <a:fld id="{48A87A34-81AB-432B-8DAE-1953F412C126}" type="datetimeFigureOut">
               <a:rPr lang="en-US" smtClean="0"/>
-              <a:t>3/18/2022</a:t>
+              <a:t>3/18/22</a:t>
             </a:fld>
             <a:endParaRPr lang="en-US" dirty="0"/>
           </a:p>
@@ -4904,7 +4917,7 @@
           <a:p>
             <a:fld id="{48A87A34-81AB-432B-8DAE-1953F412C126}" type="datetimeFigureOut">
               <a:rPr lang="en-US" smtClean="0"/>
-              <a:t>3/18/2022</a:t>
+              <a:t>3/18/22</a:t>
             </a:fld>
             <a:endParaRPr lang="en-US" dirty="0"/>
           </a:p>
@@ -5182,7 +5195,7 @@
           <a:p>
             <a:fld id="{48A87A34-81AB-432B-8DAE-1953F412C126}" type="datetimeFigureOut">
               <a:rPr lang="en-US" smtClean="0"/>
-              <a:t>3/18/2022</a:t>
+              <a:t>3/18/22</a:t>
             </a:fld>
             <a:endParaRPr lang="en-US" dirty="0"/>
           </a:p>
@@ -5615,7 +5628,7 @@
             <a:fld id="{48A87A34-81AB-432B-8DAE-1953F412C126}" type="datetimeFigureOut">
               <a:rPr lang="en-US" smtClean="0"/>
               <a:pPr/>
-              <a:t>3/18/2022</a:t>
+              <a:t>3/18/22</a:t>
             </a:fld>
             <a:endParaRPr lang="en-US" dirty="0"/>
           </a:p>

</xml_diff>